<commit_message>
Schema V0.2: Added messageId, defined multiple attributes as required. Examples adjusted.
</commit_message>
<xml_diff>
--- a/interface/atmosphere_tmaf-m_schema.pptx
+++ b/interface/atmosphere_tmaf-m_schema.pptx
@@ -5,8 +5,7 @@
     <p:sldMasterId id="2147483648" r:id="rId1"/>
   </p:sldMasterIdLst>
   <p:sldIdLst>
-    <p:sldId id="256" r:id="rId2"/>
-    <p:sldId id="257" r:id="rId3"/>
+    <p:sldId id="257" r:id="rId2"/>
   </p:sldIdLst>
   <p:sldSz cx="12192000" cy="6858000"/>
   <p:notesSz cx="6858000" cy="9144000"/>
@@ -105,6 +104,11 @@
       </a:defRPr>
     </a:lvl9pPr>
   </p:defaultTextStyle>
+  <p:extLst>
+    <p:ext uri="{EFAFB233-063F-42B5-8137-9DF3F51BA10A}">
+      <p15:sldGuideLst xmlns:p15="http://schemas.microsoft.com/office/powerpoint/2012/main"/>
+    </p:ext>
+  </p:extLst>
 </p:presentation>
 </file>
 
@@ -255,7 +259,7 @@
           <a:p>
             <a:fld id="{3A654DF1-76FF-004F-87A3-271744627492}" type="datetimeFigureOut">
               <a:rPr lang="en-US" smtClean="0"/>
-              <a:t>4/26/18</a:t>
+              <a:t>4/29/18</a:t>
             </a:fld>
             <a:endParaRPr lang="en-US"/>
           </a:p>
@@ -453,7 +457,7 @@
           <a:p>
             <a:fld id="{3A654DF1-76FF-004F-87A3-271744627492}" type="datetimeFigureOut">
               <a:rPr lang="en-US" smtClean="0"/>
-              <a:t>4/26/18</a:t>
+              <a:t>4/29/18</a:t>
             </a:fld>
             <a:endParaRPr lang="en-US"/>
           </a:p>
@@ -661,7 +665,7 @@
           <a:p>
             <a:fld id="{3A654DF1-76FF-004F-87A3-271744627492}" type="datetimeFigureOut">
               <a:rPr lang="en-US" smtClean="0"/>
-              <a:t>4/26/18</a:t>
+              <a:t>4/29/18</a:t>
             </a:fld>
             <a:endParaRPr lang="en-US"/>
           </a:p>
@@ -859,7 +863,7 @@
           <a:p>
             <a:fld id="{3A654DF1-76FF-004F-87A3-271744627492}" type="datetimeFigureOut">
               <a:rPr lang="en-US" smtClean="0"/>
-              <a:t>4/26/18</a:t>
+              <a:t>4/29/18</a:t>
             </a:fld>
             <a:endParaRPr lang="en-US"/>
           </a:p>
@@ -1134,7 +1138,7 @@
           <a:p>
             <a:fld id="{3A654DF1-76FF-004F-87A3-271744627492}" type="datetimeFigureOut">
               <a:rPr lang="en-US" smtClean="0"/>
-              <a:t>4/26/18</a:t>
+              <a:t>4/29/18</a:t>
             </a:fld>
             <a:endParaRPr lang="en-US"/>
           </a:p>
@@ -1399,7 +1403,7 @@
           <a:p>
             <a:fld id="{3A654DF1-76FF-004F-87A3-271744627492}" type="datetimeFigureOut">
               <a:rPr lang="en-US" smtClean="0"/>
-              <a:t>4/26/18</a:t>
+              <a:t>4/29/18</a:t>
             </a:fld>
             <a:endParaRPr lang="en-US"/>
           </a:p>
@@ -1811,7 +1815,7 @@
           <a:p>
             <a:fld id="{3A654DF1-76FF-004F-87A3-271744627492}" type="datetimeFigureOut">
               <a:rPr lang="en-US" smtClean="0"/>
-              <a:t>4/26/18</a:t>
+              <a:t>4/29/18</a:t>
             </a:fld>
             <a:endParaRPr lang="en-US"/>
           </a:p>
@@ -1952,7 +1956,7 @@
           <a:p>
             <a:fld id="{3A654DF1-76FF-004F-87A3-271744627492}" type="datetimeFigureOut">
               <a:rPr lang="en-US" smtClean="0"/>
-              <a:t>4/26/18</a:t>
+              <a:t>4/29/18</a:t>
             </a:fld>
             <a:endParaRPr lang="en-US"/>
           </a:p>
@@ -2065,7 +2069,7 @@
           <a:p>
             <a:fld id="{3A654DF1-76FF-004F-87A3-271744627492}" type="datetimeFigureOut">
               <a:rPr lang="en-US" smtClean="0"/>
-              <a:t>4/26/18</a:t>
+              <a:t>4/29/18</a:t>
             </a:fld>
             <a:endParaRPr lang="en-US"/>
           </a:p>
@@ -2376,7 +2380,7 @@
           <a:p>
             <a:fld id="{3A654DF1-76FF-004F-87A3-271744627492}" type="datetimeFigureOut">
               <a:rPr lang="en-US" smtClean="0"/>
-              <a:t>4/26/18</a:t>
+              <a:t>4/29/18</a:t>
             </a:fld>
             <a:endParaRPr lang="en-US"/>
           </a:p>
@@ -2664,7 +2668,7 @@
           <a:p>
             <a:fld id="{3A654DF1-76FF-004F-87A3-271744627492}" type="datetimeFigureOut">
               <a:rPr lang="en-US" smtClean="0"/>
-              <a:t>4/26/18</a:t>
+              <a:t>4/29/18</a:t>
             </a:fld>
             <a:endParaRPr lang="en-US"/>
           </a:p>
@@ -2905,7 +2909,7 @@
           <a:p>
             <a:fld id="{3A654DF1-76FF-004F-87A3-271744627492}" type="datetimeFigureOut">
               <a:rPr lang="en-US" smtClean="0"/>
-              <a:t>4/26/18</a:t>
+              <a:t>4/29/18</a:t>
             </a:fld>
             <a:endParaRPr lang="en-US"/>
           </a:p>
@@ -3324,10 +3328,10 @@
       </p:grpSpPr>
       <p:pic>
         <p:nvPicPr>
-          <p:cNvPr id="6" name="Picture 5">
-            <a:extLst>
-              <a:ext uri="{FF2B5EF4-FFF2-40B4-BE49-F238E27FC236}">
-                <a16:creationId xmlns:a16="http://schemas.microsoft.com/office/drawing/2014/main" id="{A79D7FC1-43A3-F749-9772-B12379852338}"/>
+          <p:cNvPr id="3" name="Picture 2">
+            <a:extLst>
+              <a:ext uri="{FF2B5EF4-FFF2-40B4-BE49-F238E27FC236}">
+                <a16:creationId xmlns:a16="http://schemas.microsoft.com/office/drawing/2014/main" id="{19E7139D-4B98-774C-8FCB-0CA481FCB4B0}"/>
               </a:ext>
             </a:extLst>
           </p:cNvPr>
@@ -3344,8 +3348,8 @@
         </p:blipFill>
         <p:spPr>
           <a:xfrm>
-            <a:off x="1219200" y="1305590"/>
-            <a:ext cx="8839200" cy="1851278"/>
+            <a:off x="2078566" y="2209464"/>
+            <a:ext cx="7431617" cy="1716183"/>
           </a:xfrm>
           <a:prstGeom prst="rect">
             <a:avLst/>
@@ -3366,7 +3370,7 @@
         </p:nvSpPr>
         <p:spPr>
           <a:xfrm>
-            <a:off x="6057900" y="1305590"/>
+            <a:off x="6616700" y="2234864"/>
             <a:ext cx="1181100" cy="396210"/>
           </a:xfrm>
           <a:prstGeom prst="wedgeRectCallout">
@@ -3418,13 +3422,13 @@
         </p:nvSpPr>
         <p:spPr>
           <a:xfrm>
-            <a:off x="4457700" y="1107485"/>
+            <a:off x="5203824" y="2011359"/>
             <a:ext cx="1181100" cy="396210"/>
           </a:xfrm>
           <a:prstGeom prst="wedgeRectCallout">
             <a:avLst>
-              <a:gd name="adj1" fmla="val -60618"/>
-              <a:gd name="adj2" fmla="val 232384"/>
+              <a:gd name="adj1" fmla="val -93593"/>
+              <a:gd name="adj2" fmla="val 258027"/>
             </a:avLst>
           </a:prstGeom>
         </p:spPr>
@@ -3470,13 +3474,13 @@
         </p:nvSpPr>
         <p:spPr>
           <a:xfrm>
-            <a:off x="3867150" y="3156868"/>
+            <a:off x="3711574" y="3925647"/>
             <a:ext cx="1492250" cy="396210"/>
           </a:xfrm>
           <a:prstGeom prst="wedgeRectCallout">
             <a:avLst>
-              <a:gd name="adj1" fmla="val 66264"/>
-              <a:gd name="adj2" fmla="val -216368"/>
+              <a:gd name="adj1" fmla="val 99456"/>
+              <a:gd name="adj2" fmla="val -174698"/>
             </a:avLst>
           </a:prstGeom>
         </p:spPr>
@@ -3503,7 +3507,7 @@
             <a:pPr algn="ctr"/>
             <a:r>
               <a:rPr lang="en-US" sz="1000" b="1" dirty="0"/>
-              <a:t>Each datum can be about different metrics</a:t>
+              <a:t>Each datum can be about different measurements/events</a:t>
             </a:r>
           </a:p>
         </p:txBody>
@@ -3522,13 +3526,13 @@
         </p:nvSpPr>
         <p:spPr>
           <a:xfrm>
-            <a:off x="5470525" y="3553078"/>
+            <a:off x="6819900" y="4110640"/>
             <a:ext cx="1492250" cy="396210"/>
           </a:xfrm>
           <a:prstGeom prst="wedgeRectCallout">
             <a:avLst>
-              <a:gd name="adj1" fmla="val 26264"/>
-              <a:gd name="adj2" fmla="val -238806"/>
+              <a:gd name="adj1" fmla="val -42672"/>
+              <a:gd name="adj2" fmla="val -142645"/>
             </a:avLst>
           </a:prstGeom>
         </p:spPr>
@@ -3560,773 +3564,62 @@
           </a:p>
         </p:txBody>
       </p:sp>
+      <p:sp>
+        <p:nvSpPr>
+          <p:cNvPr id="11" name="Rectangular Callout 10">
+            <a:extLst>
+              <a:ext uri="{FF2B5EF4-FFF2-40B4-BE49-F238E27FC236}">
+                <a16:creationId xmlns:a16="http://schemas.microsoft.com/office/drawing/2014/main" id="{604A4DA4-0B25-FD42-9499-AE913FBA0BDD}"/>
+              </a:ext>
+            </a:extLst>
+          </p:cNvPr>
+          <p:cNvSpPr/>
+          <p:nvPr/>
+        </p:nvSpPr>
+        <p:spPr>
+          <a:xfrm>
+            <a:off x="2078566" y="1049980"/>
+            <a:ext cx="1181100" cy="396210"/>
+          </a:xfrm>
+          <a:prstGeom prst="wedgeRectCallout">
+            <a:avLst>
+              <a:gd name="adj1" fmla="val 88486"/>
+              <a:gd name="adj2" fmla="val 441802"/>
+            </a:avLst>
+          </a:prstGeom>
+        </p:spPr>
+        <p:style>
+          <a:lnRef idx="2">
+            <a:schemeClr val="accent1">
+              <a:shade val="50000"/>
+            </a:schemeClr>
+          </a:lnRef>
+          <a:fillRef idx="1">
+            <a:schemeClr val="accent1"/>
+          </a:fillRef>
+          <a:effectRef idx="0">
+            <a:schemeClr val="accent1"/>
+          </a:effectRef>
+          <a:fontRef idx="minor">
+            <a:schemeClr val="lt1"/>
+          </a:fontRef>
+        </p:style>
+        <p:txBody>
+          <a:bodyPr rtlCol="0" anchor="ctr"/>
+          <a:lstStyle/>
+          <a:p>
+            <a:pPr algn="ctr"/>
+            <a:r>
+              <a:rPr lang="en-US" sz="1000" b="1" dirty="0"/>
+              <a:t>Check for repeated</a:t>
+            </a:r>
+          </a:p>
+        </p:txBody>
+      </p:sp>
     </p:spTree>
     <p:extLst>
       <p:ext uri="{BB962C8B-B14F-4D97-AF65-F5344CB8AC3E}">
-        <p14:creationId xmlns:p14="http://schemas.microsoft.com/office/powerpoint/2010/main" val="222383568"/>
-      </p:ext>
-    </p:extLst>
-  </p:cSld>
-  <p:clrMapOvr>
-    <a:masterClrMapping/>
-  </p:clrMapOvr>
-</p:sld>
-</file>
-
-<file path=ppt/slides/slide2.xml><?xml version="1.0" encoding="utf-8"?>
-<p:sld xmlns:a="http://schemas.openxmlformats.org/drawingml/2006/main" xmlns:r="http://schemas.openxmlformats.org/officeDocument/2006/relationships" xmlns:p="http://schemas.openxmlformats.org/presentationml/2006/main">
-  <p:cSld>
-    <p:spTree>
-      <p:nvGrpSpPr>
-        <p:cNvPr id="1" name=""/>
-        <p:cNvGrpSpPr/>
-        <p:nvPr/>
-      </p:nvGrpSpPr>
-      <p:grpSpPr>
-        <a:xfrm>
-          <a:off x="0" y="0"/>
-          <a:ext cx="0" cy="0"/>
-          <a:chOff x="0" y="0"/>
-          <a:chExt cx="0" cy="0"/>
-        </a:xfrm>
-      </p:grpSpPr>
-      <p:sp>
-        <p:nvSpPr>
-          <p:cNvPr id="4" name="TextBox 3">
-            <a:extLst>
-              <a:ext uri="{FF2B5EF4-FFF2-40B4-BE49-F238E27FC236}">
-                <a16:creationId xmlns:a16="http://schemas.microsoft.com/office/drawing/2014/main" id="{B031FA11-FC2A-8C43-9BF9-E62825D2D76C}"/>
-              </a:ext>
-            </a:extLst>
-          </p:cNvPr>
-          <p:cNvSpPr txBox="1"/>
-          <p:nvPr/>
-        </p:nvSpPr>
-        <p:spPr>
-          <a:xfrm>
-            <a:off x="152400" y="139700"/>
-            <a:ext cx="4711700" cy="3000821"/>
-          </a:xfrm>
-          <a:prstGeom prst="rect">
-            <a:avLst/>
-          </a:prstGeom>
-          <a:noFill/>
-        </p:spPr>
-        <p:txBody>
-          <a:bodyPr wrap="square" rtlCol="0">
-            <a:spAutoFit/>
-          </a:bodyPr>
-          <a:lstStyle/>
-          <a:p>
-            <a:r>
-              <a:rPr lang="en-US" sz="1050" dirty="0">
-                <a:latin typeface="Consolas" panose="020B0609020204030204" pitchFamily="49" charset="0"/>
-                <a:cs typeface="Consolas" panose="020B0609020204030204" pitchFamily="49" charset="0"/>
-              </a:rPr>
-              <a:t>{</a:t>
-            </a:r>
-          </a:p>
-          <a:p>
-            <a:r>
-              <a:rPr lang="en-US" sz="1050" dirty="0">
-                <a:latin typeface="Consolas" panose="020B0609020204030204" pitchFamily="49" charset="0"/>
-                <a:cs typeface="Consolas" panose="020B0609020204030204" pitchFamily="49" charset="0"/>
-              </a:rPr>
-              <a:t>    "</a:t>
-            </a:r>
-            <a:r>
-              <a:rPr lang="en-US" sz="1050" dirty="0" err="1">
-                <a:latin typeface="Consolas" panose="020B0609020204030204" pitchFamily="49" charset="0"/>
-                <a:cs typeface="Consolas" panose="020B0609020204030204" pitchFamily="49" charset="0"/>
-              </a:rPr>
-              <a:t>probeId</a:t>
-            </a:r>
-            <a:r>
-              <a:rPr lang="en-US" sz="1050" dirty="0">
-                <a:latin typeface="Consolas" panose="020B0609020204030204" pitchFamily="49" charset="0"/>
-                <a:cs typeface="Consolas" panose="020B0609020204030204" pitchFamily="49" charset="0"/>
-              </a:rPr>
-              <a:t>": 10,</a:t>
-            </a:r>
-          </a:p>
-          <a:p>
-            <a:r>
-              <a:rPr lang="en-US" sz="1050" dirty="0">
-                <a:latin typeface="Consolas" panose="020B0609020204030204" pitchFamily="49" charset="0"/>
-                <a:cs typeface="Consolas" panose="020B0609020204030204" pitchFamily="49" charset="0"/>
-              </a:rPr>
-              <a:t>    "</a:t>
-            </a:r>
-            <a:r>
-              <a:rPr lang="en-US" sz="1050" dirty="0" err="1">
-                <a:latin typeface="Consolas" panose="020B0609020204030204" pitchFamily="49" charset="0"/>
-                <a:cs typeface="Consolas" panose="020B0609020204030204" pitchFamily="49" charset="0"/>
-              </a:rPr>
-              <a:t>resourceId</a:t>
-            </a:r>
-            <a:r>
-              <a:rPr lang="en-US" sz="1050" dirty="0">
-                <a:latin typeface="Consolas" panose="020B0609020204030204" pitchFamily="49" charset="0"/>
-                <a:cs typeface="Consolas" panose="020B0609020204030204" pitchFamily="49" charset="0"/>
-              </a:rPr>
-              <a:t>": 11,</a:t>
-            </a:r>
-          </a:p>
-          <a:p>
-            <a:r>
-              <a:rPr lang="en-US" sz="1050" dirty="0">
-                <a:latin typeface="Consolas" panose="020B0609020204030204" pitchFamily="49" charset="0"/>
-                <a:cs typeface="Consolas" panose="020B0609020204030204" pitchFamily="49" charset="0"/>
-              </a:rPr>
-              <a:t>    "</a:t>
-            </a:r>
-            <a:r>
-              <a:rPr lang="en-US" sz="1050" dirty="0" err="1">
-                <a:latin typeface="Consolas" panose="020B0609020204030204" pitchFamily="49" charset="0"/>
-                <a:cs typeface="Consolas" panose="020B0609020204030204" pitchFamily="49" charset="0"/>
-              </a:rPr>
-              <a:t>sentTime</a:t>
-            </a:r>
-            <a:r>
-              <a:rPr lang="en-US" sz="1050" dirty="0">
-                <a:latin typeface="Consolas" panose="020B0609020204030204" pitchFamily="49" charset="0"/>
-                <a:cs typeface="Consolas" panose="020B0609020204030204" pitchFamily="49" charset="0"/>
-              </a:rPr>
-              <a:t>": 1524782450,</a:t>
-            </a:r>
-          </a:p>
-          <a:p>
-            <a:r>
-              <a:rPr lang="en-US" sz="1050" dirty="0">
-                <a:latin typeface="Consolas" panose="020B0609020204030204" pitchFamily="49" charset="0"/>
-                <a:cs typeface="Consolas" panose="020B0609020204030204" pitchFamily="49" charset="0"/>
-              </a:rPr>
-              <a:t>    "data": [</a:t>
-            </a:r>
-          </a:p>
-          <a:p>
-            <a:r>
-              <a:rPr lang="en-US" sz="1050" dirty="0">
-                <a:latin typeface="Consolas" panose="020B0609020204030204" pitchFamily="49" charset="0"/>
-                <a:cs typeface="Consolas" panose="020B0609020204030204" pitchFamily="49" charset="0"/>
-              </a:rPr>
-              <a:t>        {</a:t>
-            </a:r>
-          </a:p>
-          <a:p>
-            <a:r>
-              <a:rPr lang="en-US" sz="1050" dirty="0">
-                <a:latin typeface="Consolas" panose="020B0609020204030204" pitchFamily="49" charset="0"/>
-                <a:cs typeface="Consolas" panose="020B0609020204030204" pitchFamily="49" charset="0"/>
-              </a:rPr>
-              <a:t>            "type": "measurement",</a:t>
-            </a:r>
-          </a:p>
-          <a:p>
-            <a:r>
-              <a:rPr lang="en-US" sz="1050" dirty="0">
-                <a:latin typeface="Consolas" panose="020B0609020204030204" pitchFamily="49" charset="0"/>
-                <a:cs typeface="Consolas" panose="020B0609020204030204" pitchFamily="49" charset="0"/>
-              </a:rPr>
-              <a:t>            "</a:t>
-            </a:r>
-            <a:r>
-              <a:rPr lang="en-US" sz="1050" dirty="0" err="1">
-                <a:latin typeface="Consolas" panose="020B0609020204030204" pitchFamily="49" charset="0"/>
-                <a:cs typeface="Consolas" panose="020B0609020204030204" pitchFamily="49" charset="0"/>
-              </a:rPr>
-              <a:t>metricId</a:t>
-            </a:r>
-            <a:r>
-              <a:rPr lang="en-US" sz="1050" dirty="0">
-                <a:latin typeface="Consolas" panose="020B0609020204030204" pitchFamily="49" charset="0"/>
-                <a:cs typeface="Consolas" panose="020B0609020204030204" pitchFamily="49" charset="0"/>
-              </a:rPr>
-              <a:t>": 2019,</a:t>
-            </a:r>
-          </a:p>
-          <a:p>
-            <a:r>
-              <a:rPr lang="en-US" sz="1050" dirty="0">
-                <a:latin typeface="Consolas" panose="020B0609020204030204" pitchFamily="49" charset="0"/>
-                <a:cs typeface="Consolas" panose="020B0609020204030204" pitchFamily="49" charset="0"/>
-              </a:rPr>
-              <a:t>            "observations": [</a:t>
-            </a:r>
-          </a:p>
-          <a:p>
-            <a:r>
-              <a:rPr lang="en-US" sz="1050" dirty="0">
-                <a:latin typeface="Consolas" panose="020B0609020204030204" pitchFamily="49" charset="0"/>
-                <a:cs typeface="Consolas" panose="020B0609020204030204" pitchFamily="49" charset="0"/>
-              </a:rPr>
-              <a:t>                {</a:t>
-            </a:r>
-          </a:p>
-          <a:p>
-            <a:r>
-              <a:rPr lang="en-US" sz="1050" dirty="0">
-                <a:latin typeface="Consolas" panose="020B0609020204030204" pitchFamily="49" charset="0"/>
-                <a:cs typeface="Consolas" panose="020B0609020204030204" pitchFamily="49" charset="0"/>
-              </a:rPr>
-              <a:t>                    "time": 1524782445,</a:t>
-            </a:r>
-          </a:p>
-          <a:p>
-            <a:r>
-              <a:rPr lang="en-US" sz="1050" dirty="0">
-                <a:latin typeface="Consolas" panose="020B0609020204030204" pitchFamily="49" charset="0"/>
-                <a:cs typeface="Consolas" panose="020B0609020204030204" pitchFamily="49" charset="0"/>
-              </a:rPr>
-              <a:t>                    "value": -1</a:t>
-            </a:r>
-          </a:p>
-          <a:p>
-            <a:r>
-              <a:rPr lang="en-US" sz="1050" dirty="0">
-                <a:latin typeface="Consolas" panose="020B0609020204030204" pitchFamily="49" charset="0"/>
-                <a:cs typeface="Consolas" panose="020B0609020204030204" pitchFamily="49" charset="0"/>
-              </a:rPr>
-              <a:t>                }</a:t>
-            </a:r>
-          </a:p>
-          <a:p>
-            <a:r>
-              <a:rPr lang="en-US" sz="1050" dirty="0">
-                <a:latin typeface="Consolas" panose="020B0609020204030204" pitchFamily="49" charset="0"/>
-                <a:cs typeface="Consolas" panose="020B0609020204030204" pitchFamily="49" charset="0"/>
-              </a:rPr>
-              <a:t>            ]</a:t>
-            </a:r>
-          </a:p>
-          <a:p>
-            <a:r>
-              <a:rPr lang="en-US" sz="1050" dirty="0">
-                <a:latin typeface="Consolas" panose="020B0609020204030204" pitchFamily="49" charset="0"/>
-                <a:cs typeface="Consolas" panose="020B0609020204030204" pitchFamily="49" charset="0"/>
-              </a:rPr>
-              <a:t>        }</a:t>
-            </a:r>
-          </a:p>
-          <a:p>
-            <a:r>
-              <a:rPr lang="en-US" sz="1050" dirty="0">
-                <a:latin typeface="Consolas" panose="020B0609020204030204" pitchFamily="49" charset="0"/>
-                <a:cs typeface="Consolas" panose="020B0609020204030204" pitchFamily="49" charset="0"/>
-              </a:rPr>
-              <a:t>    ]</a:t>
-            </a:r>
-          </a:p>
-          <a:p>
-            <a:r>
-              <a:rPr lang="en-US" sz="1050" dirty="0">
-                <a:latin typeface="Consolas" panose="020B0609020204030204" pitchFamily="49" charset="0"/>
-                <a:cs typeface="Consolas" panose="020B0609020204030204" pitchFamily="49" charset="0"/>
-              </a:rPr>
-              <a:t>}</a:t>
-            </a:r>
-          </a:p>
-          <a:p>
-            <a:endParaRPr lang="en-US" sz="1050" dirty="0">
-              <a:latin typeface="Consolas" panose="020B0609020204030204" pitchFamily="49" charset="0"/>
-              <a:cs typeface="Consolas" panose="020B0609020204030204" pitchFamily="49" charset="0"/>
-            </a:endParaRPr>
-          </a:p>
-        </p:txBody>
-      </p:sp>
-      <p:sp>
-        <p:nvSpPr>
-          <p:cNvPr id="5" name="TextBox 4">
-            <a:extLst>
-              <a:ext uri="{FF2B5EF4-FFF2-40B4-BE49-F238E27FC236}">
-                <a16:creationId xmlns:a16="http://schemas.microsoft.com/office/drawing/2014/main" id="{F273BE65-E893-FA40-A4F7-6E82423C9853}"/>
-              </a:ext>
-            </a:extLst>
-          </p:cNvPr>
-          <p:cNvSpPr txBox="1"/>
-          <p:nvPr/>
-        </p:nvSpPr>
-        <p:spPr>
-          <a:xfrm>
-            <a:off x="4762500" y="139700"/>
-            <a:ext cx="4711700" cy="7201972"/>
-          </a:xfrm>
-          <a:prstGeom prst="rect">
-            <a:avLst/>
-          </a:prstGeom>
-          <a:noFill/>
-        </p:spPr>
-        <p:txBody>
-          <a:bodyPr wrap="square" rtlCol="0">
-            <a:spAutoFit/>
-          </a:bodyPr>
-          <a:lstStyle/>
-          <a:p>
-            <a:r>
-              <a:rPr lang="en-US" sz="1050" dirty="0">
-                <a:latin typeface="Consolas" panose="020B0609020204030204" pitchFamily="49" charset="0"/>
-                <a:cs typeface="Consolas" panose="020B0609020204030204" pitchFamily="49" charset="0"/>
-              </a:rPr>
-              <a:t>{</a:t>
-            </a:r>
-          </a:p>
-          <a:p>
-            <a:r>
-              <a:rPr lang="en-US" sz="1050" dirty="0">
-                <a:latin typeface="Consolas" panose="020B0609020204030204" pitchFamily="49" charset="0"/>
-                <a:cs typeface="Consolas" panose="020B0609020204030204" pitchFamily="49" charset="0"/>
-              </a:rPr>
-              <a:t>    "</a:t>
-            </a:r>
-            <a:r>
-              <a:rPr lang="en-US" sz="1050" dirty="0" err="1">
-                <a:latin typeface="Consolas" panose="020B0609020204030204" pitchFamily="49" charset="0"/>
-                <a:cs typeface="Consolas" panose="020B0609020204030204" pitchFamily="49" charset="0"/>
-              </a:rPr>
-              <a:t>probeId</a:t>
-            </a:r>
-            <a:r>
-              <a:rPr lang="en-US" sz="1050" dirty="0">
-                <a:latin typeface="Consolas" panose="020B0609020204030204" pitchFamily="49" charset="0"/>
-                <a:cs typeface="Consolas" panose="020B0609020204030204" pitchFamily="49" charset="0"/>
-              </a:rPr>
-              <a:t>": 10,</a:t>
-            </a:r>
-          </a:p>
-          <a:p>
-            <a:r>
-              <a:rPr lang="en-US" sz="1050" dirty="0">
-                <a:latin typeface="Consolas" panose="020B0609020204030204" pitchFamily="49" charset="0"/>
-                <a:cs typeface="Consolas" panose="020B0609020204030204" pitchFamily="49" charset="0"/>
-              </a:rPr>
-              <a:t>    "</a:t>
-            </a:r>
-            <a:r>
-              <a:rPr lang="en-US" sz="1050" dirty="0" err="1">
-                <a:latin typeface="Consolas" panose="020B0609020204030204" pitchFamily="49" charset="0"/>
-                <a:cs typeface="Consolas" panose="020B0609020204030204" pitchFamily="49" charset="0"/>
-              </a:rPr>
-              <a:t>resourceId</a:t>
-            </a:r>
-            <a:r>
-              <a:rPr lang="en-US" sz="1050" dirty="0">
-                <a:latin typeface="Consolas" panose="020B0609020204030204" pitchFamily="49" charset="0"/>
-                <a:cs typeface="Consolas" panose="020B0609020204030204" pitchFamily="49" charset="0"/>
-              </a:rPr>
-              <a:t>": 11,</a:t>
-            </a:r>
-          </a:p>
-          <a:p>
-            <a:r>
-              <a:rPr lang="en-US" sz="1050" dirty="0">
-                <a:latin typeface="Consolas" panose="020B0609020204030204" pitchFamily="49" charset="0"/>
-                <a:cs typeface="Consolas" panose="020B0609020204030204" pitchFamily="49" charset="0"/>
-              </a:rPr>
-              <a:t>    "</a:t>
-            </a:r>
-            <a:r>
-              <a:rPr lang="en-US" sz="1050" dirty="0" err="1">
-                <a:latin typeface="Consolas" panose="020B0609020204030204" pitchFamily="49" charset="0"/>
-                <a:cs typeface="Consolas" panose="020B0609020204030204" pitchFamily="49" charset="0"/>
-              </a:rPr>
-              <a:t>sentTime</a:t>
-            </a:r>
-            <a:r>
-              <a:rPr lang="en-US" sz="1050" dirty="0">
-                <a:latin typeface="Consolas" panose="020B0609020204030204" pitchFamily="49" charset="0"/>
-                <a:cs typeface="Consolas" panose="020B0609020204030204" pitchFamily="49" charset="0"/>
-              </a:rPr>
-              <a:t>": 1524782450,</a:t>
-            </a:r>
-          </a:p>
-          <a:p>
-            <a:r>
-              <a:rPr lang="en-US" sz="1050" dirty="0">
-                <a:latin typeface="Consolas" panose="020B0609020204030204" pitchFamily="49" charset="0"/>
-                <a:cs typeface="Consolas" panose="020B0609020204030204" pitchFamily="49" charset="0"/>
-              </a:rPr>
-              <a:t>    "data": [</a:t>
-            </a:r>
-          </a:p>
-          <a:p>
-            <a:r>
-              <a:rPr lang="en-US" sz="1050" dirty="0">
-                <a:latin typeface="Consolas" panose="020B0609020204030204" pitchFamily="49" charset="0"/>
-                <a:cs typeface="Consolas" panose="020B0609020204030204" pitchFamily="49" charset="0"/>
-              </a:rPr>
-              <a:t>        {</a:t>
-            </a:r>
-          </a:p>
-          <a:p>
-            <a:r>
-              <a:rPr lang="en-US" sz="1050" dirty="0">
-                <a:latin typeface="Consolas" panose="020B0609020204030204" pitchFamily="49" charset="0"/>
-                <a:cs typeface="Consolas" panose="020B0609020204030204" pitchFamily="49" charset="0"/>
-              </a:rPr>
-              <a:t>            "type": "event",</a:t>
-            </a:r>
-          </a:p>
-          <a:p>
-            <a:r>
-              <a:rPr lang="en-US" sz="1050" dirty="0">
-                <a:latin typeface="Consolas" panose="020B0609020204030204" pitchFamily="49" charset="0"/>
-                <a:cs typeface="Consolas" panose="020B0609020204030204" pitchFamily="49" charset="0"/>
-              </a:rPr>
-              <a:t>            "</a:t>
-            </a:r>
-            <a:r>
-              <a:rPr lang="en-US" sz="1050" dirty="0" err="1">
-                <a:latin typeface="Consolas" panose="020B0609020204030204" pitchFamily="49" charset="0"/>
-                <a:cs typeface="Consolas" panose="020B0609020204030204" pitchFamily="49" charset="0"/>
-              </a:rPr>
-              <a:t>metricId</a:t>
-            </a:r>
-            <a:r>
-              <a:rPr lang="en-US" sz="1050" dirty="0">
-                <a:latin typeface="Consolas" panose="020B0609020204030204" pitchFamily="49" charset="0"/>
-                <a:cs typeface="Consolas" panose="020B0609020204030204" pitchFamily="49" charset="0"/>
-              </a:rPr>
-              <a:t>": 2018,</a:t>
-            </a:r>
-          </a:p>
-          <a:p>
-            <a:r>
-              <a:rPr lang="en-US" sz="1050" dirty="0">
-                <a:latin typeface="Consolas" panose="020B0609020204030204" pitchFamily="49" charset="0"/>
-                <a:cs typeface="Consolas" panose="020B0609020204030204" pitchFamily="49" charset="0"/>
-              </a:rPr>
-              <a:t>            "observations": [{</a:t>
-            </a:r>
-          </a:p>
-          <a:p>
-            <a:r>
-              <a:rPr lang="en-US" sz="1050" dirty="0">
-                <a:latin typeface="Consolas" panose="020B0609020204030204" pitchFamily="49" charset="0"/>
-                <a:cs typeface="Consolas" panose="020B0609020204030204" pitchFamily="49" charset="0"/>
-              </a:rPr>
-              <a:t>                    "time": 1524782445,</a:t>
-            </a:r>
-          </a:p>
-          <a:p>
-            <a:r>
-              <a:rPr lang="en-US" sz="1050" dirty="0">
-                <a:latin typeface="Consolas" panose="020B0609020204030204" pitchFamily="49" charset="0"/>
-                <a:cs typeface="Consolas" panose="020B0609020204030204" pitchFamily="49" charset="0"/>
-              </a:rPr>
-              <a:t>                    "value": -1</a:t>
-            </a:r>
-          </a:p>
-          <a:p>
-            <a:r>
-              <a:rPr lang="en-US" sz="1050" dirty="0">
-                <a:latin typeface="Consolas" panose="020B0609020204030204" pitchFamily="49" charset="0"/>
-                <a:cs typeface="Consolas" panose="020B0609020204030204" pitchFamily="49" charset="0"/>
-              </a:rPr>
-              <a:t>                }</a:t>
-            </a:r>
-          </a:p>
-          <a:p>
-            <a:r>
-              <a:rPr lang="en-US" sz="1050" dirty="0">
-                <a:latin typeface="Consolas" panose="020B0609020204030204" pitchFamily="49" charset="0"/>
-                <a:cs typeface="Consolas" panose="020B0609020204030204" pitchFamily="49" charset="0"/>
-              </a:rPr>
-              <a:t>            ]</a:t>
-            </a:r>
-          </a:p>
-          <a:p>
-            <a:r>
-              <a:rPr lang="en-US" sz="1050" dirty="0">
-                <a:latin typeface="Consolas" panose="020B0609020204030204" pitchFamily="49" charset="0"/>
-                <a:cs typeface="Consolas" panose="020B0609020204030204" pitchFamily="49" charset="0"/>
-              </a:rPr>
-              <a:t>        },</a:t>
-            </a:r>
-          </a:p>
-          <a:p>
-            <a:r>
-              <a:rPr lang="en-US" sz="1050" dirty="0">
-                <a:latin typeface="Consolas" panose="020B0609020204030204" pitchFamily="49" charset="0"/>
-                <a:cs typeface="Consolas" panose="020B0609020204030204" pitchFamily="49" charset="0"/>
-              </a:rPr>
-              <a:t>        {</a:t>
-            </a:r>
-          </a:p>
-          <a:p>
-            <a:r>
-              <a:rPr lang="en-US" sz="1050" dirty="0">
-                <a:latin typeface="Consolas" panose="020B0609020204030204" pitchFamily="49" charset="0"/>
-                <a:cs typeface="Consolas" panose="020B0609020204030204" pitchFamily="49" charset="0"/>
-              </a:rPr>
-              <a:t>            "type": "measurement",</a:t>
-            </a:r>
-          </a:p>
-          <a:p>
-            <a:r>
-              <a:rPr lang="en-US" sz="1050" dirty="0">
-                <a:latin typeface="Consolas" panose="020B0609020204030204" pitchFamily="49" charset="0"/>
-                <a:cs typeface="Consolas" panose="020B0609020204030204" pitchFamily="49" charset="0"/>
-              </a:rPr>
-              <a:t>            "</a:t>
-            </a:r>
-            <a:r>
-              <a:rPr lang="en-US" sz="1050" dirty="0" err="1">
-                <a:latin typeface="Consolas" panose="020B0609020204030204" pitchFamily="49" charset="0"/>
-                <a:cs typeface="Consolas" panose="020B0609020204030204" pitchFamily="49" charset="0"/>
-              </a:rPr>
-              <a:t>metricId</a:t>
-            </a:r>
-            <a:r>
-              <a:rPr lang="en-US" sz="1050" dirty="0">
-                <a:latin typeface="Consolas" panose="020B0609020204030204" pitchFamily="49" charset="0"/>
-                <a:cs typeface="Consolas" panose="020B0609020204030204" pitchFamily="49" charset="0"/>
-              </a:rPr>
-              <a:t>": 1010,</a:t>
-            </a:r>
-          </a:p>
-          <a:p>
-            <a:r>
-              <a:rPr lang="en-US" sz="1050" dirty="0">
-                <a:latin typeface="Consolas" panose="020B0609020204030204" pitchFamily="49" charset="0"/>
-                <a:cs typeface="Consolas" panose="020B0609020204030204" pitchFamily="49" charset="0"/>
-              </a:rPr>
-              <a:t>            "observations": [</a:t>
-            </a:r>
-          </a:p>
-          <a:p>
-            <a:r>
-              <a:rPr lang="en-US" sz="1050" dirty="0">
-                <a:latin typeface="Consolas" panose="020B0609020204030204" pitchFamily="49" charset="0"/>
-                <a:cs typeface="Consolas" panose="020B0609020204030204" pitchFamily="49" charset="0"/>
-              </a:rPr>
-              <a:t>                {</a:t>
-            </a:r>
-          </a:p>
-          <a:p>
-            <a:r>
-              <a:rPr lang="en-US" sz="1050" dirty="0">
-                <a:latin typeface="Consolas" panose="020B0609020204030204" pitchFamily="49" charset="0"/>
-                <a:cs typeface="Consolas" panose="020B0609020204030204" pitchFamily="49" charset="0"/>
-              </a:rPr>
-              <a:t>                    "time": 1524782440,</a:t>
-            </a:r>
-          </a:p>
-          <a:p>
-            <a:r>
-              <a:rPr lang="en-US" sz="1050" dirty="0">
-                <a:latin typeface="Consolas" panose="020B0609020204030204" pitchFamily="49" charset="0"/>
-                <a:cs typeface="Consolas" panose="020B0609020204030204" pitchFamily="49" charset="0"/>
-              </a:rPr>
-              <a:t>                    "value": 1000</a:t>
-            </a:r>
-          </a:p>
-          <a:p>
-            <a:r>
-              <a:rPr lang="en-US" sz="1050" dirty="0">
-                <a:latin typeface="Consolas" panose="020B0609020204030204" pitchFamily="49" charset="0"/>
-                <a:cs typeface="Consolas" panose="020B0609020204030204" pitchFamily="49" charset="0"/>
-              </a:rPr>
-              <a:t>                },</a:t>
-            </a:r>
-          </a:p>
-          <a:p>
-            <a:r>
-              <a:rPr lang="en-US" sz="1050" dirty="0">
-                <a:latin typeface="Consolas" panose="020B0609020204030204" pitchFamily="49" charset="0"/>
-                <a:cs typeface="Consolas" panose="020B0609020204030204" pitchFamily="49" charset="0"/>
-              </a:rPr>
-              <a:t>                {</a:t>
-            </a:r>
-          </a:p>
-          <a:p>
-            <a:r>
-              <a:rPr lang="en-US" sz="1050" dirty="0">
-                <a:latin typeface="Consolas" panose="020B0609020204030204" pitchFamily="49" charset="0"/>
-                <a:cs typeface="Consolas" panose="020B0609020204030204" pitchFamily="49" charset="0"/>
-              </a:rPr>
-              <a:t>                    "time": 1524782441,</a:t>
-            </a:r>
-          </a:p>
-          <a:p>
-            <a:r>
-              <a:rPr lang="en-US" sz="1050" dirty="0">
-                <a:latin typeface="Consolas" panose="020B0609020204030204" pitchFamily="49" charset="0"/>
-                <a:cs typeface="Consolas" panose="020B0609020204030204" pitchFamily="49" charset="0"/>
-              </a:rPr>
-              <a:t>                    "value": 1001</a:t>
-            </a:r>
-          </a:p>
-          <a:p>
-            <a:r>
-              <a:rPr lang="en-US" sz="1050" dirty="0">
-                <a:latin typeface="Consolas" panose="020B0609020204030204" pitchFamily="49" charset="0"/>
-                <a:cs typeface="Consolas" panose="020B0609020204030204" pitchFamily="49" charset="0"/>
-              </a:rPr>
-              <a:t>                },</a:t>
-            </a:r>
-          </a:p>
-          <a:p>
-            <a:r>
-              <a:rPr lang="en-US" sz="1050" dirty="0">
-                <a:latin typeface="Consolas" panose="020B0609020204030204" pitchFamily="49" charset="0"/>
-                <a:cs typeface="Consolas" panose="020B0609020204030204" pitchFamily="49" charset="0"/>
-              </a:rPr>
-              <a:t>                {</a:t>
-            </a:r>
-          </a:p>
-          <a:p>
-            <a:r>
-              <a:rPr lang="en-US" sz="1050" dirty="0">
-                <a:latin typeface="Consolas" panose="020B0609020204030204" pitchFamily="49" charset="0"/>
-                <a:cs typeface="Consolas" panose="020B0609020204030204" pitchFamily="49" charset="0"/>
-              </a:rPr>
-              <a:t>                    "time": 1524782442,</a:t>
-            </a:r>
-          </a:p>
-          <a:p>
-            <a:r>
-              <a:rPr lang="en-US" sz="1050" dirty="0">
-                <a:latin typeface="Consolas" panose="020B0609020204030204" pitchFamily="49" charset="0"/>
-                <a:cs typeface="Consolas" panose="020B0609020204030204" pitchFamily="49" charset="0"/>
-              </a:rPr>
-              <a:t>                    "value": 1002</a:t>
-            </a:r>
-          </a:p>
-          <a:p>
-            <a:r>
-              <a:rPr lang="en-US" sz="1050" dirty="0">
-                <a:latin typeface="Consolas" panose="020B0609020204030204" pitchFamily="49" charset="0"/>
-                <a:cs typeface="Consolas" panose="020B0609020204030204" pitchFamily="49" charset="0"/>
-              </a:rPr>
-              <a:t>                },</a:t>
-            </a:r>
-          </a:p>
-          <a:p>
-            <a:r>
-              <a:rPr lang="en-US" sz="1050" dirty="0">
-                <a:latin typeface="Consolas" panose="020B0609020204030204" pitchFamily="49" charset="0"/>
-                <a:cs typeface="Consolas" panose="020B0609020204030204" pitchFamily="49" charset="0"/>
-              </a:rPr>
-              <a:t>                {</a:t>
-            </a:r>
-          </a:p>
-          <a:p>
-            <a:r>
-              <a:rPr lang="en-US" sz="1050" dirty="0">
-                <a:latin typeface="Consolas" panose="020B0609020204030204" pitchFamily="49" charset="0"/>
-                <a:cs typeface="Consolas" panose="020B0609020204030204" pitchFamily="49" charset="0"/>
-              </a:rPr>
-              <a:t>                    "time": 1524782443,</a:t>
-            </a:r>
-          </a:p>
-          <a:p>
-            <a:r>
-              <a:rPr lang="en-US" sz="1050" dirty="0">
-                <a:latin typeface="Consolas" panose="020B0609020204030204" pitchFamily="49" charset="0"/>
-                <a:cs typeface="Consolas" panose="020B0609020204030204" pitchFamily="49" charset="0"/>
-              </a:rPr>
-              <a:t>                    "value": 1003</a:t>
-            </a:r>
-          </a:p>
-          <a:p>
-            <a:r>
-              <a:rPr lang="en-US" sz="1050" dirty="0">
-                <a:latin typeface="Consolas" panose="020B0609020204030204" pitchFamily="49" charset="0"/>
-                <a:cs typeface="Consolas" panose="020B0609020204030204" pitchFamily="49" charset="0"/>
-              </a:rPr>
-              <a:t>                },</a:t>
-            </a:r>
-          </a:p>
-          <a:p>
-            <a:r>
-              <a:rPr lang="en-US" sz="1050" dirty="0">
-                <a:latin typeface="Consolas" panose="020B0609020204030204" pitchFamily="49" charset="0"/>
-                <a:cs typeface="Consolas" panose="020B0609020204030204" pitchFamily="49" charset="0"/>
-              </a:rPr>
-              <a:t>                {</a:t>
-            </a:r>
-          </a:p>
-          <a:p>
-            <a:r>
-              <a:rPr lang="en-US" sz="1050" dirty="0">
-                <a:latin typeface="Consolas" panose="020B0609020204030204" pitchFamily="49" charset="0"/>
-                <a:cs typeface="Consolas" panose="020B0609020204030204" pitchFamily="49" charset="0"/>
-              </a:rPr>
-              <a:t>                    "time": 1524782444,</a:t>
-            </a:r>
-          </a:p>
-          <a:p>
-            <a:r>
-              <a:rPr lang="en-US" sz="1050" dirty="0">
-                <a:latin typeface="Consolas" panose="020B0609020204030204" pitchFamily="49" charset="0"/>
-                <a:cs typeface="Consolas" panose="020B0609020204030204" pitchFamily="49" charset="0"/>
-              </a:rPr>
-              <a:t>                    "value": 1004</a:t>
-            </a:r>
-          </a:p>
-          <a:p>
-            <a:r>
-              <a:rPr lang="en-US" sz="1050" dirty="0">
-                <a:latin typeface="Consolas" panose="020B0609020204030204" pitchFamily="49" charset="0"/>
-                <a:cs typeface="Consolas" panose="020B0609020204030204" pitchFamily="49" charset="0"/>
-              </a:rPr>
-              <a:t>                }</a:t>
-            </a:r>
-          </a:p>
-          <a:p>
-            <a:r>
-              <a:rPr lang="en-US" sz="1050" dirty="0">
-                <a:latin typeface="Consolas" panose="020B0609020204030204" pitchFamily="49" charset="0"/>
-                <a:cs typeface="Consolas" panose="020B0609020204030204" pitchFamily="49" charset="0"/>
-              </a:rPr>
-              <a:t>            ]</a:t>
-            </a:r>
-          </a:p>
-          <a:p>
-            <a:r>
-              <a:rPr lang="en-US" sz="1050" dirty="0">
-                <a:latin typeface="Consolas" panose="020B0609020204030204" pitchFamily="49" charset="0"/>
-                <a:cs typeface="Consolas" panose="020B0609020204030204" pitchFamily="49" charset="0"/>
-              </a:rPr>
-              <a:t>        }</a:t>
-            </a:r>
-          </a:p>
-          <a:p>
-            <a:r>
-              <a:rPr lang="en-US" sz="1050" dirty="0">
-                <a:latin typeface="Consolas" panose="020B0609020204030204" pitchFamily="49" charset="0"/>
-                <a:cs typeface="Consolas" panose="020B0609020204030204" pitchFamily="49" charset="0"/>
-              </a:rPr>
-              <a:t>    ]</a:t>
-            </a:r>
-          </a:p>
-          <a:p>
-            <a:r>
-              <a:rPr lang="en-US" sz="1050" dirty="0">
-                <a:latin typeface="Consolas" panose="020B0609020204030204" pitchFamily="49" charset="0"/>
-                <a:cs typeface="Consolas" panose="020B0609020204030204" pitchFamily="49" charset="0"/>
-              </a:rPr>
-              <a:t>}</a:t>
-            </a:r>
-          </a:p>
-          <a:p>
-            <a:endParaRPr lang="en-US" sz="1050" dirty="0">
-              <a:latin typeface="Consolas" panose="020B0609020204030204" pitchFamily="49" charset="0"/>
-              <a:cs typeface="Consolas" panose="020B0609020204030204" pitchFamily="49" charset="0"/>
-            </a:endParaRPr>
-          </a:p>
-          <a:p>
-            <a:endParaRPr lang="en-US" sz="1050" dirty="0">
-              <a:latin typeface="Consolas" panose="020B0609020204030204" pitchFamily="49" charset="0"/>
-              <a:cs typeface="Consolas" panose="020B0609020204030204" pitchFamily="49" charset="0"/>
-            </a:endParaRPr>
-          </a:p>
-        </p:txBody>
-      </p:sp>
-    </p:spTree>
-    <p:extLst>
-      <p:ext uri="{BB962C8B-B14F-4D97-AF65-F5344CB8AC3E}">
-        <p14:creationId xmlns:p14="http://schemas.microsoft.com/office/powerpoint/2010/main" val="3992860294"/>
+        <p14:creationId xmlns:p14="http://schemas.microsoft.com/office/powerpoint/2010/main" val="100231503"/>
       </p:ext>
     </p:extLst>
   </p:cSld>

</xml_diff>